<commit_message>
Modified interface and presentation
</commit_message>
<xml_diff>
--- a/Презентация сравнение тарифов.pptx
+++ b/Презентация сравнение тарифов.pptx
@@ -11,8 +11,10 @@
     <p:sldId id="259" r:id="rId5"/>
     <p:sldId id="260" r:id="rId6"/>
     <p:sldId id="261" r:id="rId7"/>
-    <p:sldId id="262" r:id="rId8"/>
-    <p:sldId id="263" r:id="rId9"/>
+    <p:sldId id="264" r:id="rId8"/>
+    <p:sldId id="265" r:id="rId9"/>
+    <p:sldId id="262" r:id="rId10"/>
+    <p:sldId id="263" r:id="rId11"/>
   </p:sldIdLst>
   <p:sldSz cx="9144000" cy="6858000" type="screen4x3"/>
   <p:notesSz cx="6858000" cy="9144000"/>
@@ -739,7 +741,7 @@
           <a:p>
             <a:fld id="{8275F27F-7D24-42F8-BA1C-FD004A3ED84E}" type="datetimeFigureOut">
               <a:rPr lang="ru-RU" smtClean="0"/>
-              <a:t>27.11.2019</a:t>
+              <a:t>29.11.2019</a:t>
             </a:fld>
             <a:endParaRPr lang="ru-RU"/>
           </a:p>
@@ -935,7 +937,7 @@
           <a:p>
             <a:fld id="{8275F27F-7D24-42F8-BA1C-FD004A3ED84E}" type="datetimeFigureOut">
               <a:rPr lang="ru-RU" smtClean="0"/>
-              <a:t>27.11.2019</a:t>
+              <a:t>29.11.2019</a:t>
             </a:fld>
             <a:endParaRPr lang="ru-RU"/>
           </a:p>
@@ -1120,7 +1122,7 @@
           <a:p>
             <a:fld id="{8275F27F-7D24-42F8-BA1C-FD004A3ED84E}" type="datetimeFigureOut">
               <a:rPr lang="ru-RU" smtClean="0"/>
-              <a:t>27.11.2019</a:t>
+              <a:t>29.11.2019</a:t>
             </a:fld>
             <a:endParaRPr lang="ru-RU"/>
           </a:p>
@@ -1270,7 +1272,7 @@
           <a:p>
             <a:fld id="{8275F27F-7D24-42F8-BA1C-FD004A3ED84E}" type="datetimeFigureOut">
               <a:rPr lang="ru-RU" smtClean="0"/>
-              <a:t>27.11.2019</a:t>
+              <a:t>29.11.2019</a:t>
             </a:fld>
             <a:endParaRPr lang="ru-RU"/>
           </a:p>
@@ -1525,7 +1527,7 @@
           <a:p>
             <a:fld id="{8275F27F-7D24-42F8-BA1C-FD004A3ED84E}" type="datetimeFigureOut">
               <a:rPr lang="ru-RU" smtClean="0"/>
-              <a:t>27.11.2019</a:t>
+              <a:t>29.11.2019</a:t>
             </a:fld>
             <a:endParaRPr lang="ru-RU"/>
           </a:p>
@@ -1934,7 +1936,7 @@
           <a:p>
             <a:fld id="{8275F27F-7D24-42F8-BA1C-FD004A3ED84E}" type="datetimeFigureOut">
               <a:rPr lang="ru-RU" smtClean="0"/>
-              <a:t>27.11.2019</a:t>
+              <a:t>29.11.2019</a:t>
             </a:fld>
             <a:endParaRPr lang="ru-RU"/>
           </a:p>
@@ -2380,7 +2382,7 @@
           <a:p>
             <a:fld id="{8275F27F-7D24-42F8-BA1C-FD004A3ED84E}" type="datetimeFigureOut">
               <a:rPr lang="ru-RU" smtClean="0"/>
-              <a:t>27.11.2019</a:t>
+              <a:t>29.11.2019</a:t>
             </a:fld>
             <a:endParaRPr lang="ru-RU"/>
           </a:p>
@@ -2481,7 +2483,7 @@
           <a:p>
             <a:fld id="{8275F27F-7D24-42F8-BA1C-FD004A3ED84E}" type="datetimeFigureOut">
               <a:rPr lang="ru-RU" smtClean="0"/>
-              <a:t>27.11.2019</a:t>
+              <a:t>29.11.2019</a:t>
             </a:fld>
             <a:endParaRPr lang="ru-RU"/>
           </a:p>
@@ -2602,7 +2604,7 @@
           <a:p>
             <a:fld id="{8275F27F-7D24-42F8-BA1C-FD004A3ED84E}" type="datetimeFigureOut">
               <a:rPr lang="ru-RU" smtClean="0"/>
-              <a:t>27.11.2019</a:t>
+              <a:t>29.11.2019</a:t>
             </a:fld>
             <a:endParaRPr lang="ru-RU"/>
           </a:p>
@@ -2876,7 +2878,7 @@
           <a:p>
             <a:fld id="{8275F27F-7D24-42F8-BA1C-FD004A3ED84E}" type="datetimeFigureOut">
               <a:rPr lang="ru-RU" smtClean="0"/>
-              <a:t>27.11.2019</a:t>
+              <a:t>29.11.2019</a:t>
             </a:fld>
             <a:endParaRPr lang="ru-RU"/>
           </a:p>
@@ -3081,7 +3083,7 @@
           <a:p>
             <a:fld id="{8275F27F-7D24-42F8-BA1C-FD004A3ED84E}" type="datetimeFigureOut">
               <a:rPr lang="ru-RU" smtClean="0"/>
-              <a:t>27.11.2019</a:t>
+              <a:t>29.11.2019</a:t>
             </a:fld>
             <a:endParaRPr lang="ru-RU"/>
           </a:p>
@@ -4190,7 +4192,7 @@
           <a:p>
             <a:fld id="{8275F27F-7D24-42F8-BA1C-FD004A3ED84E}" type="datetimeFigureOut">
               <a:rPr lang="ru-RU" smtClean="0"/>
-              <a:t>27.11.2019</a:t>
+              <a:t>29.11.2019</a:t>
             </a:fld>
             <a:endParaRPr lang="ru-RU"/>
           </a:p>
@@ -4747,13 +4749,189 @@
   <p:clrMapOvr>
     <a:masterClrMapping/>
   </p:clrMapOvr>
-  <mc:AlternateContent xmlns:mc="http://schemas.openxmlformats.org/markup-compatibility/2006">
-    <mc:Choice xmlns:p14="http://schemas.microsoft.com/office/powerpoint/2010/main" Requires="p14">
+  <mc:AlternateContent xmlns:mc="http://schemas.openxmlformats.org/markup-compatibility/2006" xmlns:p14="http://schemas.microsoft.com/office/powerpoint/2010/main">
+    <mc:Choice Requires="p14">
       <p:transition spd="med" p14:dur="700">
         <p:fade/>
       </p:transition>
     </mc:Choice>
-    <mc:Fallback>
+    <mc:Fallback xmlns="">
+      <p:transition spd="med">
+        <p:fade/>
+      </p:transition>
+    </mc:Fallback>
+  </mc:AlternateContent>
+  <p:timing>
+    <p:tnLst>
+      <p:par>
+        <p:cTn id="1" dur="indefinite" restart="never" nodeType="tmRoot"/>
+      </p:par>
+    </p:tnLst>
+  </p:timing>
+</p:sld>
+</file>
+
+<file path=ppt/slides/slide10.xml><?xml version="1.0" encoding="utf-8"?>
+<p:sld xmlns:a="http://schemas.openxmlformats.org/drawingml/2006/main" xmlns:r="http://schemas.openxmlformats.org/officeDocument/2006/relationships" xmlns:p="http://schemas.openxmlformats.org/presentationml/2006/main">
+  <p:cSld>
+    <p:spTree>
+      <p:nvGrpSpPr>
+        <p:cNvPr id="1" name=""/>
+        <p:cNvGrpSpPr/>
+        <p:nvPr/>
+      </p:nvGrpSpPr>
+      <p:grpSpPr>
+        <a:xfrm>
+          <a:off x="0" y="0"/>
+          <a:ext cx="0" cy="0"/>
+          <a:chOff x="0" y="0"/>
+          <a:chExt cx="0" cy="0"/>
+        </a:xfrm>
+      </p:grpSpPr>
+      <p:sp>
+        <p:nvSpPr>
+          <p:cNvPr id="2" name="Объект 1"/>
+          <p:cNvSpPr>
+            <a:spLocks noGrp="1"/>
+          </p:cNvSpPr>
+          <p:nvPr>
+            <p:ph idx="1"/>
+          </p:nvPr>
+        </p:nvSpPr>
+        <p:spPr>
+          <a:xfrm>
+            <a:off x="467544" y="836712"/>
+            <a:ext cx="8229600" cy="5544616"/>
+          </a:xfrm>
+        </p:spPr>
+        <p:txBody>
+          <a:bodyPr>
+            <a:normAutofit fontScale="85000" lnSpcReduction="20000"/>
+          </a:bodyPr>
+          <a:lstStyle/>
+          <a:p>
+            <a:pPr algn="just"/>
+            <a:r>
+              <a:rPr lang="ru-RU" dirty="0"/>
+              <a:t>В рамках дипломного проекта было разработано пользовательское веб-приложение для сравнения тарифов </a:t>
+            </a:r>
+            <a:r>
+              <a:rPr lang="ru-RU" dirty="0" smtClean="0"/>
+              <a:t>мобильной </a:t>
+            </a:r>
+            <a:r>
+              <a:rPr lang="ru-RU" dirty="0"/>
+              <a:t>связи и доступа в интернет.</a:t>
+            </a:r>
+          </a:p>
+          <a:p>
+            <a:pPr algn="just"/>
+            <a:r>
+              <a:rPr lang="ru-RU" dirty="0"/>
+              <a:t>В результате проделанной работы </a:t>
+            </a:r>
+            <a:r>
+              <a:rPr lang="ru-RU" dirty="0" smtClean="0"/>
+              <a:t>разработан сервер, позволяющий </a:t>
+            </a:r>
+            <a:r>
+              <a:rPr lang="ru-RU" dirty="0"/>
+              <a:t>пополнять базу данных актуальных тарифов мобильной связи и доступа к </a:t>
+            </a:r>
+            <a:r>
+              <a:rPr lang="ru-RU" dirty="0" smtClean="0"/>
+              <a:t>интернет.</a:t>
+            </a:r>
+            <a:endParaRPr lang="ru-RU" dirty="0"/>
+          </a:p>
+          <a:p>
+            <a:pPr algn="just"/>
+            <a:r>
+              <a:rPr lang="ru-RU" dirty="0"/>
+              <a:t>Разработанное программное средство может быть полезно для пользователей </a:t>
+            </a:r>
+            <a:r>
+              <a:rPr lang="ru-RU" dirty="0" smtClean="0"/>
+              <a:t>мобильными телефонами, планшетами, услугами интернет провайдеров</a:t>
+            </a:r>
+            <a:r>
+              <a:rPr lang="ru-RU" dirty="0"/>
+              <a:t>.</a:t>
+            </a:r>
+          </a:p>
+          <a:p>
+            <a:pPr algn="just"/>
+            <a:r>
+              <a:rPr lang="ru-RU" dirty="0"/>
+              <a:t>В дальнейшем планируется улучшение представленного приложения в рамках расширения функционала: предоставления возможности поиска информации о тарифе</a:t>
+            </a:r>
+            <a:r>
+              <a:rPr lang="ru-RU" dirty="0" smtClean="0"/>
+              <a:t>, создание </a:t>
+            </a:r>
+            <a:r>
+              <a:rPr lang="ru-RU" dirty="0" err="1" smtClean="0"/>
+              <a:t>агрегатора</a:t>
+            </a:r>
+            <a:r>
+              <a:rPr lang="ru-RU" dirty="0" smtClean="0"/>
+              <a:t> тарифов, использование более оптимальных технологий обмена данными с веб-сервером.</a:t>
+            </a:r>
+            <a:endParaRPr lang="ru-RU" dirty="0"/>
+          </a:p>
+          <a:p>
+            <a:endParaRPr lang="ru-RU" dirty="0"/>
+          </a:p>
+        </p:txBody>
+      </p:sp>
+      <p:sp>
+        <p:nvSpPr>
+          <p:cNvPr id="3" name="Заголовок 2"/>
+          <p:cNvSpPr>
+            <a:spLocks noGrp="1"/>
+          </p:cNvSpPr>
+          <p:nvPr>
+            <p:ph type="title"/>
+          </p:nvPr>
+        </p:nvSpPr>
+        <p:spPr>
+          <a:xfrm>
+            <a:off x="457200" y="274638"/>
+            <a:ext cx="8229600" cy="418058"/>
+          </a:xfrm>
+        </p:spPr>
+        <p:txBody>
+          <a:bodyPr>
+            <a:normAutofit fontScale="90000"/>
+          </a:bodyPr>
+          <a:lstStyle/>
+          <a:p>
+            <a:pPr algn="ctr"/>
+            <a:r>
+              <a:rPr lang="ru-RU" dirty="0" smtClean="0"/>
+              <a:t>Заключение</a:t>
+            </a:r>
+            <a:endParaRPr lang="ru-RU" dirty="0"/>
+          </a:p>
+        </p:txBody>
+      </p:sp>
+    </p:spTree>
+    <p:extLst>
+      <p:ext uri="{BB962C8B-B14F-4D97-AF65-F5344CB8AC3E}">
+        <p14:creationId xmlns:p14="http://schemas.microsoft.com/office/powerpoint/2010/main" val="3205023292"/>
+      </p:ext>
+    </p:extLst>
+  </p:cSld>
+  <p:clrMapOvr>
+    <a:masterClrMapping/>
+  </p:clrMapOvr>
+  <mc:AlternateContent xmlns:mc="http://schemas.openxmlformats.org/markup-compatibility/2006" xmlns:p14="http://schemas.microsoft.com/office/powerpoint/2010/main">
+    <mc:Choice Requires="p14">
+      <p:transition spd="med" p14:dur="700">
+        <p:fade/>
+      </p:transition>
+    </mc:Choice>
+    <mc:Fallback xmlns="">
       <p:transition spd="med">
         <p:fade/>
       </p:transition>
@@ -4868,13 +5046,13 @@
   <p:clrMapOvr>
     <a:masterClrMapping/>
   </p:clrMapOvr>
-  <mc:AlternateContent xmlns:mc="http://schemas.openxmlformats.org/markup-compatibility/2006">
-    <mc:Choice xmlns:p14="http://schemas.microsoft.com/office/powerpoint/2010/main" Requires="p14">
+  <mc:AlternateContent xmlns:mc="http://schemas.openxmlformats.org/markup-compatibility/2006" xmlns:p14="http://schemas.microsoft.com/office/powerpoint/2010/main">
+    <mc:Choice Requires="p14">
       <p:transition spd="med" p14:dur="700">
         <p:fade/>
       </p:transition>
     </mc:Choice>
-    <mc:Fallback>
+    <mc:Fallback xmlns="">
       <p:transition spd="med">
         <p:fade/>
       </p:transition>
@@ -5053,13 +5231,13 @@
   <p:clrMapOvr>
     <a:masterClrMapping/>
   </p:clrMapOvr>
-  <mc:AlternateContent xmlns:mc="http://schemas.openxmlformats.org/markup-compatibility/2006">
-    <mc:Choice xmlns:p14="http://schemas.microsoft.com/office/powerpoint/2010/main" Requires="p14">
+  <mc:AlternateContent xmlns:mc="http://schemas.openxmlformats.org/markup-compatibility/2006" xmlns:p14="http://schemas.microsoft.com/office/powerpoint/2010/main">
+    <mc:Choice Requires="p14">
       <p:transition spd="med" p14:dur="700">
         <p:fade/>
       </p:transition>
     </mc:Choice>
-    <mc:Fallback>
+    <mc:Fallback xmlns="">
       <p:transition spd="med">
         <p:fade/>
       </p:transition>
@@ -5128,7 +5306,7 @@
           <p:cNvPr id="4" name="Picture 2" descr="Картинки по запросу microsoft visual studio">
             <a:extLst>
               <a:ext uri="{FF2B5EF4-FFF2-40B4-BE49-F238E27FC236}">
-                <a16:creationId xmlns:a16="http://schemas.microsoft.com/office/drawing/2014/main" xmlns="" id="{5B6DD496-9654-4021-9C04-84C7ED0D4A61}"/>
+                <a16:creationId xmlns="" xmlns:a16="http://schemas.microsoft.com/office/drawing/2014/main" id="{5B6DD496-9654-4021-9C04-84C7ED0D4A61}"/>
               </a:ext>
             </a:extLst>
           </p:cNvPr>
@@ -5378,7 +5556,7 @@
           <p:cNvPr id="12" name="Picture 8" descr="Картинки по запросу c# logo">
             <a:extLst>
               <a:ext uri="{FF2B5EF4-FFF2-40B4-BE49-F238E27FC236}">
-                <a16:creationId xmlns:a16="http://schemas.microsoft.com/office/drawing/2014/main" xmlns="" id="{53F6153A-AE8A-4EFE-BB76-32D3836249E2}"/>
+                <a16:creationId xmlns="" xmlns:a16="http://schemas.microsoft.com/office/drawing/2014/main" id="{53F6153A-AE8A-4EFE-BB76-32D3836249E2}"/>
               </a:ext>
             </a:extLst>
           </p:cNvPr>
@@ -5471,13 +5649,13 @@
   <p:clrMapOvr>
     <a:masterClrMapping/>
   </p:clrMapOvr>
-  <mc:AlternateContent xmlns:mc="http://schemas.openxmlformats.org/markup-compatibility/2006">
-    <mc:Choice xmlns:p14="http://schemas.microsoft.com/office/powerpoint/2010/main" Requires="p14">
+  <mc:AlternateContent xmlns:mc="http://schemas.openxmlformats.org/markup-compatibility/2006" xmlns:p14="http://schemas.microsoft.com/office/powerpoint/2010/main">
+    <mc:Choice Requires="p14">
       <p:transition spd="med" p14:dur="700">
         <p:fade/>
       </p:transition>
     </mc:Choice>
-    <mc:Fallback>
+    <mc:Fallback xmlns="">
       <p:transition spd="med">
         <p:fade/>
       </p:transition>
@@ -5773,13 +5951,13 @@
   <p:clrMapOvr>
     <a:masterClrMapping/>
   </p:clrMapOvr>
-  <mc:AlternateContent xmlns:mc="http://schemas.openxmlformats.org/markup-compatibility/2006">
-    <mc:Choice xmlns:p14="http://schemas.microsoft.com/office/powerpoint/2010/main" Requires="p14">
+  <mc:AlternateContent xmlns:mc="http://schemas.openxmlformats.org/markup-compatibility/2006" xmlns:p14="http://schemas.microsoft.com/office/powerpoint/2010/main">
+    <mc:Choice Requires="p14">
       <p:transition spd="med" p14:dur="700">
         <p:fade/>
       </p:transition>
     </mc:Choice>
-    <mc:Fallback>
+    <mc:Fallback xmlns="">
       <p:transition spd="med">
         <p:fade/>
       </p:transition>
@@ -5921,13 +6099,13 @@
   <p:clrMapOvr>
     <a:masterClrMapping/>
   </p:clrMapOvr>
-  <mc:AlternateContent xmlns:mc="http://schemas.openxmlformats.org/markup-compatibility/2006">
-    <mc:Choice xmlns:p14="http://schemas.microsoft.com/office/powerpoint/2010/main" Requires="p14">
+  <mc:AlternateContent xmlns:mc="http://schemas.openxmlformats.org/markup-compatibility/2006" xmlns:p14="http://schemas.microsoft.com/office/powerpoint/2010/main">
+    <mc:Choice Requires="p14">
       <p:transition spd="med" p14:dur="700">
         <p:fade/>
       </p:transition>
     </mc:Choice>
-    <mc:Fallback>
+    <mc:Fallback xmlns="">
       <p:transition spd="med">
         <p:fade/>
       </p:transition>
@@ -5975,7 +6153,29 @@
           <a:bodyPr/>
           <a:lstStyle/>
           <a:p>
-            <a:endParaRPr lang="ru-RU"/>
+            <a:r>
+              <a:rPr lang="ru-RU" dirty="0" smtClean="0"/>
+              <a:t>Создать: </a:t>
+            </a:r>
+          </a:p>
+          <a:p>
+            <a:pPr lvl="1"/>
+            <a:r>
+              <a:rPr lang="ru-RU" dirty="0" smtClean="0"/>
+              <a:t>новый параметр тарифа</a:t>
+            </a:r>
+          </a:p>
+          <a:p>
+            <a:pPr lvl="1"/>
+            <a:r>
+              <a:rPr lang="ru-RU" dirty="0" smtClean="0"/>
+              <a:t>новый тариф со </a:t>
+            </a:r>
+            <a:r>
+              <a:rPr lang="ru-RU" smtClean="0"/>
+              <a:t>всеми параметрами</a:t>
+            </a:r>
+            <a:endParaRPr lang="ru-RU" dirty="0"/>
           </a:p>
         </p:txBody>
       </p:sp>
@@ -5989,18 +6189,16 @@
             <p:ph type="title"/>
           </p:nvPr>
         </p:nvSpPr>
-        <p:spPr>
-          <a:xfrm>
-            <a:off x="457200" y="274638"/>
-            <a:ext cx="8229600" cy="634082"/>
-          </a:xfrm>
-        </p:spPr>
-        <p:txBody>
-          <a:bodyPr>
-            <a:normAutofit fontScale="90000"/>
-          </a:bodyPr>
+        <p:spPr/>
+        <p:txBody>
+          <a:bodyPr/>
           <a:lstStyle/>
           <a:p>
+            <a:pPr algn="ctr"/>
+            <a:r>
+              <a:rPr lang="ru-RU" dirty="0" smtClean="0"/>
+              <a:t>Возможности приложения</a:t>
+            </a:r>
             <a:endParaRPr lang="ru-RU" dirty="0"/>
           </a:p>
         </p:txBody>
@@ -6008,7 +6206,7 @@
     </p:spTree>
     <p:extLst>
       <p:ext uri="{BB962C8B-B14F-4D97-AF65-F5344CB8AC3E}">
-        <p14:creationId xmlns:p14="http://schemas.microsoft.com/office/powerpoint/2010/main" val="3020406422"/>
+        <p14:creationId xmlns:p14="http://schemas.microsoft.com/office/powerpoint/2010/main" val="837622597"/>
       </p:ext>
     </p:extLst>
   </p:cSld>
@@ -6064,89 +6262,12 @@
             <p:ph idx="1"/>
           </p:nvPr>
         </p:nvSpPr>
-        <p:spPr>
-          <a:xfrm>
-            <a:off x="467544" y="836712"/>
-            <a:ext cx="8229600" cy="5544616"/>
-          </a:xfrm>
-        </p:spPr>
-        <p:txBody>
-          <a:bodyPr>
-            <a:normAutofit fontScale="85000" lnSpcReduction="20000"/>
-          </a:bodyPr>
+        <p:spPr/>
+        <p:txBody>
+          <a:bodyPr/>
           <a:lstStyle/>
           <a:p>
-            <a:pPr algn="just"/>
-            <a:r>
-              <a:rPr lang="ru-RU" dirty="0"/>
-              <a:t>В рамках дипломного проекта было разработано пользовательское веб-приложение для сравнения тарифов </a:t>
-            </a:r>
-            <a:r>
-              <a:rPr lang="ru-RU" dirty="0" smtClean="0"/>
-              <a:t>мобильной </a:t>
-            </a:r>
-            <a:r>
-              <a:rPr lang="ru-RU" dirty="0"/>
-              <a:t>связи и доступа в интернет.</a:t>
-            </a:r>
-          </a:p>
-          <a:p>
-            <a:pPr algn="just"/>
-            <a:r>
-              <a:rPr lang="ru-RU" dirty="0"/>
-              <a:t>В результате проделанной работы </a:t>
-            </a:r>
-            <a:r>
-              <a:rPr lang="ru-RU" dirty="0" smtClean="0"/>
-              <a:t>разработан сервер, позволяющий </a:t>
-            </a:r>
-            <a:r>
-              <a:rPr lang="ru-RU" dirty="0"/>
-              <a:t>пополнять базу данных актуальных тарифов мобильной связи и доступа к </a:t>
-            </a:r>
-            <a:r>
-              <a:rPr lang="ru-RU" dirty="0" smtClean="0"/>
-              <a:t>интернет.</a:t>
-            </a:r>
-            <a:endParaRPr lang="ru-RU" dirty="0"/>
-          </a:p>
-          <a:p>
-            <a:pPr algn="just"/>
-            <a:r>
-              <a:rPr lang="ru-RU" dirty="0"/>
-              <a:t>Разработанное программное средство может быть полезно для пользователей </a:t>
-            </a:r>
-            <a:r>
-              <a:rPr lang="ru-RU" dirty="0" smtClean="0"/>
-              <a:t>мобильными телефонами, планшетами, услугами интернет провайдеров</a:t>
-            </a:r>
-            <a:r>
-              <a:rPr lang="ru-RU" dirty="0"/>
-              <a:t>.</a:t>
-            </a:r>
-          </a:p>
-          <a:p>
-            <a:pPr algn="just"/>
-            <a:r>
-              <a:rPr lang="ru-RU" dirty="0"/>
-              <a:t>В дальнейшем планируется улучшение представленного приложения в рамках расширения функционала: предоставления возможности поиска информации о тарифе</a:t>
-            </a:r>
-            <a:r>
-              <a:rPr lang="ru-RU" dirty="0" smtClean="0"/>
-              <a:t>, создание </a:t>
-            </a:r>
-            <a:r>
-              <a:rPr lang="ru-RU" dirty="0" err="1" smtClean="0"/>
-              <a:t>агрегатора</a:t>
-            </a:r>
-            <a:r>
-              <a:rPr lang="ru-RU" dirty="0" smtClean="0"/>
-              <a:t> тарифов, использование более оптимальных технологий обмена данными с веб-сервером.</a:t>
-            </a:r>
-            <a:endParaRPr lang="ru-RU" dirty="0"/>
-          </a:p>
-          <a:p>
-            <a:endParaRPr lang="ru-RU" dirty="0"/>
+            <a:endParaRPr lang="ru-RU"/>
           </a:p>
         </p:txBody>
       </p:sp>
@@ -6160,31 +6281,19 @@
             <p:ph type="title"/>
           </p:nvPr>
         </p:nvSpPr>
-        <p:spPr>
-          <a:xfrm>
-            <a:off x="457200" y="274638"/>
-            <a:ext cx="8229600" cy="418058"/>
-          </a:xfrm>
-        </p:spPr>
-        <p:txBody>
-          <a:bodyPr>
-            <a:normAutofit fontScale="90000"/>
-          </a:bodyPr>
+        <p:spPr/>
+        <p:txBody>
+          <a:bodyPr/>
           <a:lstStyle/>
           <a:p>
-            <a:pPr algn="ctr"/>
-            <a:r>
-              <a:rPr lang="ru-RU" dirty="0" smtClean="0"/>
-              <a:t>Заключение</a:t>
-            </a:r>
-            <a:endParaRPr lang="ru-RU" dirty="0"/>
+            <a:endParaRPr lang="ru-RU"/>
           </a:p>
         </p:txBody>
       </p:sp>
     </p:spTree>
     <p:extLst>
       <p:ext uri="{BB962C8B-B14F-4D97-AF65-F5344CB8AC3E}">
-        <p14:creationId xmlns:p14="http://schemas.microsoft.com/office/powerpoint/2010/main" val="3205023292"/>
+        <p14:creationId xmlns:p14="http://schemas.microsoft.com/office/powerpoint/2010/main" val="38051333"/>
       </p:ext>
     </p:extLst>
   </p:cSld>
@@ -6198,6 +6307,100 @@
       </p:transition>
     </mc:Choice>
     <mc:Fallback>
+      <p:transition spd="med">
+        <p:fade/>
+      </p:transition>
+    </mc:Fallback>
+  </mc:AlternateContent>
+  <p:timing>
+    <p:tnLst>
+      <p:par>
+        <p:cTn id="1" dur="indefinite" restart="never" nodeType="tmRoot"/>
+      </p:par>
+    </p:tnLst>
+  </p:timing>
+</p:sld>
+</file>
+
+<file path=ppt/slides/slide9.xml><?xml version="1.0" encoding="utf-8"?>
+<p:sld xmlns:a="http://schemas.openxmlformats.org/drawingml/2006/main" xmlns:r="http://schemas.openxmlformats.org/officeDocument/2006/relationships" xmlns:p="http://schemas.openxmlformats.org/presentationml/2006/main">
+  <p:cSld>
+    <p:spTree>
+      <p:nvGrpSpPr>
+        <p:cNvPr id="1" name=""/>
+        <p:cNvGrpSpPr/>
+        <p:nvPr/>
+      </p:nvGrpSpPr>
+      <p:grpSpPr>
+        <a:xfrm>
+          <a:off x="0" y="0"/>
+          <a:ext cx="0" cy="0"/>
+          <a:chOff x="0" y="0"/>
+          <a:chExt cx="0" cy="0"/>
+        </a:xfrm>
+      </p:grpSpPr>
+      <p:sp>
+        <p:nvSpPr>
+          <p:cNvPr id="2" name="Объект 1"/>
+          <p:cNvSpPr>
+            <a:spLocks noGrp="1"/>
+          </p:cNvSpPr>
+          <p:nvPr>
+            <p:ph idx="1"/>
+          </p:nvPr>
+        </p:nvSpPr>
+        <p:spPr/>
+        <p:txBody>
+          <a:bodyPr/>
+          <a:lstStyle/>
+          <a:p>
+            <a:endParaRPr lang="ru-RU"/>
+          </a:p>
+        </p:txBody>
+      </p:sp>
+      <p:sp>
+        <p:nvSpPr>
+          <p:cNvPr id="3" name="Заголовок 2"/>
+          <p:cNvSpPr>
+            <a:spLocks noGrp="1"/>
+          </p:cNvSpPr>
+          <p:nvPr>
+            <p:ph type="title"/>
+          </p:nvPr>
+        </p:nvSpPr>
+        <p:spPr>
+          <a:xfrm>
+            <a:off x="457200" y="274638"/>
+            <a:ext cx="8229600" cy="634082"/>
+          </a:xfrm>
+        </p:spPr>
+        <p:txBody>
+          <a:bodyPr>
+            <a:normAutofit fontScale="90000"/>
+          </a:bodyPr>
+          <a:lstStyle/>
+          <a:p>
+            <a:endParaRPr lang="ru-RU" dirty="0"/>
+          </a:p>
+        </p:txBody>
+      </p:sp>
+    </p:spTree>
+    <p:extLst>
+      <p:ext uri="{BB962C8B-B14F-4D97-AF65-F5344CB8AC3E}">
+        <p14:creationId xmlns:p14="http://schemas.microsoft.com/office/powerpoint/2010/main" val="3020406422"/>
+      </p:ext>
+    </p:extLst>
+  </p:cSld>
+  <p:clrMapOvr>
+    <a:masterClrMapping/>
+  </p:clrMapOvr>
+  <mc:AlternateContent xmlns:mc="http://schemas.openxmlformats.org/markup-compatibility/2006" xmlns:p14="http://schemas.microsoft.com/office/powerpoint/2010/main">
+    <mc:Choice Requires="p14">
+      <p:transition spd="med" p14:dur="700">
+        <p:fade/>
+      </p:transition>
+    </mc:Choice>
+    <mc:Fallback xmlns="">
       <p:transition spd="med">
         <p:fade/>
       </p:transition>

</xml_diff>

<commit_message>
Links and presentation were modified
</commit_message>
<xml_diff>
--- a/Презентация сравнение тарифов.pptx
+++ b/Презентация сравнение тарифов.pptx
@@ -12,9 +12,8 @@
     <p:sldId id="260" r:id="rId6"/>
     <p:sldId id="261" r:id="rId7"/>
     <p:sldId id="264" r:id="rId8"/>
-    <p:sldId id="265" r:id="rId9"/>
-    <p:sldId id="262" r:id="rId10"/>
-    <p:sldId id="263" r:id="rId11"/>
+    <p:sldId id="262" r:id="rId9"/>
+    <p:sldId id="263" r:id="rId10"/>
   </p:sldIdLst>
   <p:sldSz cx="9144000" cy="6858000" type="screen4x3"/>
   <p:notesSz cx="6858000" cy="9144000"/>
@@ -4771,182 +4770,6 @@
 </p:sld>
 </file>
 
-<file path=ppt/slides/slide10.xml><?xml version="1.0" encoding="utf-8"?>
-<p:sld xmlns:a="http://schemas.openxmlformats.org/drawingml/2006/main" xmlns:r="http://schemas.openxmlformats.org/officeDocument/2006/relationships" xmlns:p="http://schemas.openxmlformats.org/presentationml/2006/main">
-  <p:cSld>
-    <p:spTree>
-      <p:nvGrpSpPr>
-        <p:cNvPr id="1" name=""/>
-        <p:cNvGrpSpPr/>
-        <p:nvPr/>
-      </p:nvGrpSpPr>
-      <p:grpSpPr>
-        <a:xfrm>
-          <a:off x="0" y="0"/>
-          <a:ext cx="0" cy="0"/>
-          <a:chOff x="0" y="0"/>
-          <a:chExt cx="0" cy="0"/>
-        </a:xfrm>
-      </p:grpSpPr>
-      <p:sp>
-        <p:nvSpPr>
-          <p:cNvPr id="2" name="Объект 1"/>
-          <p:cNvSpPr>
-            <a:spLocks noGrp="1"/>
-          </p:cNvSpPr>
-          <p:nvPr>
-            <p:ph idx="1"/>
-          </p:nvPr>
-        </p:nvSpPr>
-        <p:spPr>
-          <a:xfrm>
-            <a:off x="467544" y="836712"/>
-            <a:ext cx="8229600" cy="5544616"/>
-          </a:xfrm>
-        </p:spPr>
-        <p:txBody>
-          <a:bodyPr>
-            <a:normAutofit fontScale="85000" lnSpcReduction="20000"/>
-          </a:bodyPr>
-          <a:lstStyle/>
-          <a:p>
-            <a:pPr algn="just"/>
-            <a:r>
-              <a:rPr lang="ru-RU" dirty="0"/>
-              <a:t>В рамках дипломного проекта было разработано пользовательское веб-приложение для сравнения тарифов </a:t>
-            </a:r>
-            <a:r>
-              <a:rPr lang="ru-RU" dirty="0" smtClean="0"/>
-              <a:t>мобильной </a:t>
-            </a:r>
-            <a:r>
-              <a:rPr lang="ru-RU" dirty="0"/>
-              <a:t>связи и доступа в интернет.</a:t>
-            </a:r>
-          </a:p>
-          <a:p>
-            <a:pPr algn="just"/>
-            <a:r>
-              <a:rPr lang="ru-RU" dirty="0"/>
-              <a:t>В результате проделанной работы </a:t>
-            </a:r>
-            <a:r>
-              <a:rPr lang="ru-RU" dirty="0" smtClean="0"/>
-              <a:t>разработан сервер, позволяющий </a:t>
-            </a:r>
-            <a:r>
-              <a:rPr lang="ru-RU" dirty="0"/>
-              <a:t>пополнять базу данных актуальных тарифов мобильной связи и доступа к </a:t>
-            </a:r>
-            <a:r>
-              <a:rPr lang="ru-RU" dirty="0" smtClean="0"/>
-              <a:t>интернет.</a:t>
-            </a:r>
-            <a:endParaRPr lang="ru-RU" dirty="0"/>
-          </a:p>
-          <a:p>
-            <a:pPr algn="just"/>
-            <a:r>
-              <a:rPr lang="ru-RU" dirty="0"/>
-              <a:t>Разработанное программное средство может быть полезно для пользователей </a:t>
-            </a:r>
-            <a:r>
-              <a:rPr lang="ru-RU" dirty="0" smtClean="0"/>
-              <a:t>мобильными телефонами, планшетами, услугами интернет провайдеров</a:t>
-            </a:r>
-            <a:r>
-              <a:rPr lang="ru-RU" dirty="0"/>
-              <a:t>.</a:t>
-            </a:r>
-          </a:p>
-          <a:p>
-            <a:pPr algn="just"/>
-            <a:r>
-              <a:rPr lang="ru-RU" dirty="0"/>
-              <a:t>В дальнейшем планируется улучшение представленного приложения в рамках расширения функционала: предоставления возможности поиска информации о тарифе</a:t>
-            </a:r>
-            <a:r>
-              <a:rPr lang="ru-RU" dirty="0" smtClean="0"/>
-              <a:t>, создание </a:t>
-            </a:r>
-            <a:r>
-              <a:rPr lang="ru-RU" dirty="0" err="1" smtClean="0"/>
-              <a:t>агрегатора</a:t>
-            </a:r>
-            <a:r>
-              <a:rPr lang="ru-RU" dirty="0" smtClean="0"/>
-              <a:t> тарифов, использование более оптимальных технологий обмена данными с веб-сервером.</a:t>
-            </a:r>
-            <a:endParaRPr lang="ru-RU" dirty="0"/>
-          </a:p>
-          <a:p>
-            <a:endParaRPr lang="ru-RU" dirty="0"/>
-          </a:p>
-        </p:txBody>
-      </p:sp>
-      <p:sp>
-        <p:nvSpPr>
-          <p:cNvPr id="3" name="Заголовок 2"/>
-          <p:cNvSpPr>
-            <a:spLocks noGrp="1"/>
-          </p:cNvSpPr>
-          <p:nvPr>
-            <p:ph type="title"/>
-          </p:nvPr>
-        </p:nvSpPr>
-        <p:spPr>
-          <a:xfrm>
-            <a:off x="457200" y="274638"/>
-            <a:ext cx="8229600" cy="418058"/>
-          </a:xfrm>
-        </p:spPr>
-        <p:txBody>
-          <a:bodyPr>
-            <a:normAutofit fontScale="90000"/>
-          </a:bodyPr>
-          <a:lstStyle/>
-          <a:p>
-            <a:pPr algn="ctr"/>
-            <a:r>
-              <a:rPr lang="ru-RU" dirty="0" smtClean="0"/>
-              <a:t>Заключение</a:t>
-            </a:r>
-            <a:endParaRPr lang="ru-RU" dirty="0"/>
-          </a:p>
-        </p:txBody>
-      </p:sp>
-    </p:spTree>
-    <p:extLst>
-      <p:ext uri="{BB962C8B-B14F-4D97-AF65-F5344CB8AC3E}">
-        <p14:creationId xmlns:p14="http://schemas.microsoft.com/office/powerpoint/2010/main" val="3205023292"/>
-      </p:ext>
-    </p:extLst>
-  </p:cSld>
-  <p:clrMapOvr>
-    <a:masterClrMapping/>
-  </p:clrMapOvr>
-  <mc:AlternateContent xmlns:mc="http://schemas.openxmlformats.org/markup-compatibility/2006" xmlns:p14="http://schemas.microsoft.com/office/powerpoint/2010/main">
-    <mc:Choice Requires="p14">
-      <p:transition spd="med" p14:dur="700">
-        <p:fade/>
-      </p:transition>
-    </mc:Choice>
-    <mc:Fallback xmlns="">
-      <p:transition spd="med">
-        <p:fade/>
-      </p:transition>
-    </mc:Fallback>
-  </mc:AlternateContent>
-  <p:timing>
-    <p:tnLst>
-      <p:par>
-        <p:cTn id="1" dur="indefinite" restart="never" nodeType="tmRoot"/>
-      </p:par>
-    </p:tnLst>
-  </p:timing>
-</p:sld>
-</file>
-
 <file path=ppt/slides/slide2.xml><?xml version="1.0" encoding="utf-8"?>
 <p:sld xmlns:a="http://schemas.openxmlformats.org/drawingml/2006/main" xmlns:r="http://schemas.openxmlformats.org/officeDocument/2006/relationships" xmlns:p="http://schemas.openxmlformats.org/presentationml/2006/main">
   <p:cSld>
@@ -6155,27 +5978,26 @@
           <a:p>
             <a:r>
               <a:rPr lang="ru-RU" dirty="0" smtClean="0"/>
-              <a:t>Создать: </a:t>
-            </a:r>
-          </a:p>
-          <a:p>
-            <a:pPr lvl="1"/>
+              <a:t>Создание нового тарифа с параметрами</a:t>
+            </a:r>
+          </a:p>
+          <a:p>
             <a:r>
               <a:rPr lang="ru-RU" dirty="0" smtClean="0"/>
-              <a:t>новый параметр тарифа</a:t>
-            </a:r>
-          </a:p>
-          <a:p>
-            <a:pPr lvl="1"/>
+              <a:t>Изменение данных о имеющимся тарифе с параметрами</a:t>
+            </a:r>
+          </a:p>
+          <a:p>
             <a:r>
               <a:rPr lang="ru-RU" dirty="0" smtClean="0"/>
-              <a:t>новый тариф со </a:t>
-            </a:r>
-            <a:r>
-              <a:rPr lang="ru-RU" smtClean="0"/>
-              <a:t>всеми параметрами</a:t>
-            </a:r>
-            <a:endParaRPr lang="ru-RU" dirty="0"/>
+              <a:t>Удаление тарифа</a:t>
+            </a:r>
+          </a:p>
+          <a:p>
+            <a:r>
+              <a:rPr lang="ru-RU" dirty="0" smtClean="0"/>
+              <a:t>Сравнение тарифов по параметрам</a:t>
+            </a:r>
           </a:p>
         </p:txBody>
       </p:sp>
@@ -6267,7 +6089,7 @@
           <a:bodyPr/>
           <a:lstStyle/>
           <a:p>
-            <a:endParaRPr lang="ru-RU"/>
+            <a:endParaRPr lang="ru-RU" dirty="0"/>
           </a:p>
         </p:txBody>
       </p:sp>
@@ -6281,32 +6103,44 @@
             <p:ph type="title"/>
           </p:nvPr>
         </p:nvSpPr>
-        <p:spPr/>
-        <p:txBody>
-          <a:bodyPr/>
+        <p:spPr>
+          <a:xfrm>
+            <a:off x="457200" y="274638"/>
+            <a:ext cx="8229600" cy="634082"/>
+          </a:xfrm>
+        </p:spPr>
+        <p:txBody>
+          <a:bodyPr>
+            <a:normAutofit fontScale="90000"/>
+          </a:bodyPr>
           <a:lstStyle/>
           <a:p>
-            <a:endParaRPr lang="ru-RU"/>
+            <a:pPr algn="ctr"/>
+            <a:r>
+              <a:rPr lang="ru-RU" dirty="0" smtClean="0"/>
+              <a:t>Безопасность</a:t>
+            </a:r>
+            <a:endParaRPr lang="ru-RU" dirty="0"/>
           </a:p>
         </p:txBody>
       </p:sp>
     </p:spTree>
     <p:extLst>
       <p:ext uri="{BB962C8B-B14F-4D97-AF65-F5344CB8AC3E}">
-        <p14:creationId xmlns:p14="http://schemas.microsoft.com/office/powerpoint/2010/main" val="38051333"/>
+        <p14:creationId xmlns:p14="http://schemas.microsoft.com/office/powerpoint/2010/main" val="3020406422"/>
       </p:ext>
     </p:extLst>
   </p:cSld>
   <p:clrMapOvr>
     <a:masterClrMapping/>
   </p:clrMapOvr>
-  <mc:AlternateContent xmlns:mc="http://schemas.openxmlformats.org/markup-compatibility/2006">
-    <mc:Choice xmlns:p14="http://schemas.microsoft.com/office/powerpoint/2010/main" Requires="p14">
+  <mc:AlternateContent xmlns:mc="http://schemas.openxmlformats.org/markup-compatibility/2006" xmlns:p14="http://schemas.microsoft.com/office/powerpoint/2010/main">
+    <mc:Choice Requires="p14">
       <p:transition spd="med" p14:dur="700">
         <p:fade/>
       </p:transition>
     </mc:Choice>
-    <mc:Fallback>
+    <mc:Fallback xmlns="">
       <p:transition spd="med">
         <p:fade/>
       </p:transition>
@@ -6349,12 +6183,89 @@
             <p:ph idx="1"/>
           </p:nvPr>
         </p:nvSpPr>
-        <p:spPr/>
-        <p:txBody>
-          <a:bodyPr/>
+        <p:spPr>
+          <a:xfrm>
+            <a:off x="467544" y="836712"/>
+            <a:ext cx="8229600" cy="5544616"/>
+          </a:xfrm>
+        </p:spPr>
+        <p:txBody>
+          <a:bodyPr>
+            <a:normAutofit fontScale="85000" lnSpcReduction="20000"/>
+          </a:bodyPr>
           <a:lstStyle/>
           <a:p>
-            <a:endParaRPr lang="ru-RU"/>
+            <a:pPr algn="just"/>
+            <a:r>
+              <a:rPr lang="ru-RU" dirty="0"/>
+              <a:t>В рамках дипломного проекта было разработано пользовательское веб-приложение для сравнения тарифов </a:t>
+            </a:r>
+            <a:r>
+              <a:rPr lang="ru-RU" dirty="0" smtClean="0"/>
+              <a:t>мобильной </a:t>
+            </a:r>
+            <a:r>
+              <a:rPr lang="ru-RU" dirty="0"/>
+              <a:t>связи и доступа в интернет.</a:t>
+            </a:r>
+          </a:p>
+          <a:p>
+            <a:pPr algn="just"/>
+            <a:r>
+              <a:rPr lang="ru-RU" dirty="0"/>
+              <a:t>В результате проделанной работы </a:t>
+            </a:r>
+            <a:r>
+              <a:rPr lang="ru-RU" dirty="0" smtClean="0"/>
+              <a:t>разработан сервер, позволяющий </a:t>
+            </a:r>
+            <a:r>
+              <a:rPr lang="ru-RU" dirty="0"/>
+              <a:t>пополнять базу данных актуальных тарифов мобильной связи и доступа к </a:t>
+            </a:r>
+            <a:r>
+              <a:rPr lang="ru-RU" dirty="0" smtClean="0"/>
+              <a:t>интернет.</a:t>
+            </a:r>
+            <a:endParaRPr lang="ru-RU" dirty="0"/>
+          </a:p>
+          <a:p>
+            <a:pPr algn="just"/>
+            <a:r>
+              <a:rPr lang="ru-RU" dirty="0"/>
+              <a:t>Разработанное программное средство может быть полезно для пользователей </a:t>
+            </a:r>
+            <a:r>
+              <a:rPr lang="ru-RU" dirty="0" smtClean="0"/>
+              <a:t>мобильными телефонами, планшетами, услугами интернет провайдеров</a:t>
+            </a:r>
+            <a:r>
+              <a:rPr lang="ru-RU" dirty="0"/>
+              <a:t>.</a:t>
+            </a:r>
+          </a:p>
+          <a:p>
+            <a:pPr algn="just"/>
+            <a:r>
+              <a:rPr lang="ru-RU" dirty="0"/>
+              <a:t>В дальнейшем планируется улучшение представленного приложения в рамках расширения функционала: предоставления возможности поиска информации о тарифе</a:t>
+            </a:r>
+            <a:r>
+              <a:rPr lang="ru-RU" dirty="0" smtClean="0"/>
+              <a:t>, создание </a:t>
+            </a:r>
+            <a:r>
+              <a:rPr lang="ru-RU" dirty="0" err="1" smtClean="0"/>
+              <a:t>агрегатора</a:t>
+            </a:r>
+            <a:r>
+              <a:rPr lang="ru-RU" dirty="0" smtClean="0"/>
+              <a:t> тарифов, использование более оптимальных технологий обмена данными с веб-сервером.</a:t>
+            </a:r>
+            <a:endParaRPr lang="ru-RU" dirty="0"/>
+          </a:p>
+          <a:p>
+            <a:endParaRPr lang="ru-RU" dirty="0"/>
           </a:p>
         </p:txBody>
       </p:sp>
@@ -6371,7 +6282,7 @@
         <p:spPr>
           <a:xfrm>
             <a:off x="457200" y="274638"/>
-            <a:ext cx="8229600" cy="634082"/>
+            <a:ext cx="8229600" cy="418058"/>
           </a:xfrm>
         </p:spPr>
         <p:txBody>
@@ -6380,6 +6291,11 @@
           </a:bodyPr>
           <a:lstStyle/>
           <a:p>
+            <a:pPr algn="ctr"/>
+            <a:r>
+              <a:rPr lang="ru-RU" dirty="0" smtClean="0"/>
+              <a:t>Заключение</a:t>
+            </a:r>
             <a:endParaRPr lang="ru-RU" dirty="0"/>
           </a:p>
         </p:txBody>
@@ -6387,7 +6303,7 @@
     </p:spTree>
     <p:extLst>
       <p:ext uri="{BB962C8B-B14F-4D97-AF65-F5344CB8AC3E}">
-        <p14:creationId xmlns:p14="http://schemas.microsoft.com/office/powerpoint/2010/main" val="3020406422"/>
+        <p14:creationId xmlns:p14="http://schemas.microsoft.com/office/powerpoint/2010/main" val="3205023292"/>
       </p:ext>
     </p:extLst>
   </p:cSld>

</xml_diff>